<commit_message>
added conclusions to slide
</commit_message>
<xml_diff>
--- a/Delivery-meeting-slides/Delivery-meeting.pptx
+++ b/Delivery-meeting-slides/Delivery-meeting.pptx
@@ -18,7 +18,8 @@
     <p:sldId id="267" r:id="rId12"/>
     <p:sldId id="268" r:id="rId13"/>
     <p:sldId id="269" r:id="rId14"/>
-    <p:sldId id="270" r:id="rId15"/>
+    <p:sldId id="271" r:id="rId15"/>
+    <p:sldId id="270" r:id="rId16"/>
   </p:sldIdLst>
   <p:sldSz cx="12192000" cy="6858000"/>
   <p:notesSz cx="6858000" cy="9144000"/>
@@ -117,6 +118,11 @@
       </a:defRPr>
     </a:lvl9pPr>
   </p:defaultTextStyle>
+  <p:extLst>
+    <p:ext uri="{EFAFB233-063F-42B5-8137-9DF3F51BA10A}">
+      <p15:sldGuideLst xmlns:p15="http://schemas.microsoft.com/office/powerpoint/2012/main"/>
+    </p:ext>
+  </p:extLst>
 </p:presentation>
 </file>
 
@@ -842,7 +848,7 @@
           <a:p>
             <a:fld id="{F4D54B8B-CF9D-4A48-A858-B7AFB3BACA32}" type="datetimeFigureOut">
               <a:rPr lang="en-GB" smtClean="0"/>
-              <a:t>23/03/2021</a:t>
+              <a:t>25/03/2021</a:t>
             </a:fld>
             <a:endParaRPr lang="en-GB"/>
           </a:p>
@@ -1093,7 +1099,7 @@
           <a:p>
             <a:fld id="{F4D54B8B-CF9D-4A48-A858-B7AFB3BACA32}" type="datetimeFigureOut">
               <a:rPr lang="en-GB" smtClean="0"/>
-              <a:t>23/03/2021</a:t>
+              <a:t>25/03/2021</a:t>
             </a:fld>
             <a:endParaRPr lang="en-GB"/>
           </a:p>
@@ -1407,7 +1413,7 @@
           <a:p>
             <a:fld id="{F4D54B8B-CF9D-4A48-A858-B7AFB3BACA32}" type="datetimeFigureOut">
               <a:rPr lang="en-GB" smtClean="0"/>
-              <a:t>23/03/2021</a:t>
+              <a:t>25/03/2021</a:t>
             </a:fld>
             <a:endParaRPr lang="en-GB"/>
           </a:p>
@@ -1748,7 +1754,7 @@
           <a:p>
             <a:fld id="{F4D54B8B-CF9D-4A48-A858-B7AFB3BACA32}" type="datetimeFigureOut">
               <a:rPr lang="en-GB" smtClean="0"/>
-              <a:t>23/03/2021</a:t>
+              <a:t>25/03/2021</a:t>
             </a:fld>
             <a:endParaRPr lang="en-GB"/>
           </a:p>
@@ -2062,7 +2068,7 @@
           <a:p>
             <a:fld id="{F4D54B8B-CF9D-4A48-A858-B7AFB3BACA32}" type="datetimeFigureOut">
               <a:rPr lang="en-GB" smtClean="0"/>
-              <a:t>23/03/2021</a:t>
+              <a:t>25/03/2021</a:t>
             </a:fld>
             <a:endParaRPr lang="en-GB"/>
           </a:p>
@@ -2455,7 +2461,7 @@
           <a:p>
             <a:fld id="{F4D54B8B-CF9D-4A48-A858-B7AFB3BACA32}" type="datetimeFigureOut">
               <a:rPr lang="en-GB" smtClean="0"/>
-              <a:t>23/03/2021</a:t>
+              <a:t>25/03/2021</a:t>
             </a:fld>
             <a:endParaRPr lang="en-GB"/>
           </a:p>
@@ -2625,7 +2631,7 @@
           <a:p>
             <a:fld id="{F4D54B8B-CF9D-4A48-A858-B7AFB3BACA32}" type="datetimeFigureOut">
               <a:rPr lang="en-GB" smtClean="0"/>
-              <a:t>23/03/2021</a:t>
+              <a:t>25/03/2021</a:t>
             </a:fld>
             <a:endParaRPr lang="en-GB"/>
           </a:p>
@@ -2805,7 +2811,7 @@
           <a:p>
             <a:fld id="{F4D54B8B-CF9D-4A48-A858-B7AFB3BACA32}" type="datetimeFigureOut">
               <a:rPr lang="en-GB" smtClean="0"/>
-              <a:t>23/03/2021</a:t>
+              <a:t>25/03/2021</a:t>
             </a:fld>
             <a:endParaRPr lang="en-GB"/>
           </a:p>
@@ -2981,7 +2987,7 @@
           <a:p>
             <a:fld id="{F4D54B8B-CF9D-4A48-A858-B7AFB3BACA32}" type="datetimeFigureOut">
               <a:rPr lang="en-GB" smtClean="0"/>
-              <a:t>23/03/2021</a:t>
+              <a:t>25/03/2021</a:t>
             </a:fld>
             <a:endParaRPr lang="en-GB"/>
           </a:p>
@@ -3228,7 +3234,7 @@
           <a:p>
             <a:fld id="{F4D54B8B-CF9D-4A48-A858-B7AFB3BACA32}" type="datetimeFigureOut">
               <a:rPr lang="en-GB" smtClean="0"/>
-              <a:t>23/03/2021</a:t>
+              <a:t>25/03/2021</a:t>
             </a:fld>
             <a:endParaRPr lang="en-GB"/>
           </a:p>
@@ -3460,7 +3466,7 @@
           <a:p>
             <a:fld id="{F4D54B8B-CF9D-4A48-A858-B7AFB3BACA32}" type="datetimeFigureOut">
               <a:rPr lang="en-GB" smtClean="0"/>
-              <a:t>23/03/2021</a:t>
+              <a:t>25/03/2021</a:t>
             </a:fld>
             <a:endParaRPr lang="en-GB"/>
           </a:p>
@@ -3834,7 +3840,7 @@
           <a:p>
             <a:fld id="{F4D54B8B-CF9D-4A48-A858-B7AFB3BACA32}" type="datetimeFigureOut">
               <a:rPr lang="en-GB" smtClean="0"/>
-              <a:t>23/03/2021</a:t>
+              <a:t>25/03/2021</a:t>
             </a:fld>
             <a:endParaRPr lang="en-GB"/>
           </a:p>
@@ -3957,7 +3963,7 @@
           <a:p>
             <a:fld id="{F4D54B8B-CF9D-4A48-A858-B7AFB3BACA32}" type="datetimeFigureOut">
               <a:rPr lang="en-GB" smtClean="0"/>
-              <a:t>23/03/2021</a:t>
+              <a:t>25/03/2021</a:t>
             </a:fld>
             <a:endParaRPr lang="en-GB"/>
           </a:p>
@@ -4052,7 +4058,7 @@
           <a:p>
             <a:fld id="{F4D54B8B-CF9D-4A48-A858-B7AFB3BACA32}" type="datetimeFigureOut">
               <a:rPr lang="en-GB" smtClean="0"/>
-              <a:t>23/03/2021</a:t>
+              <a:t>25/03/2021</a:t>
             </a:fld>
             <a:endParaRPr lang="en-GB"/>
           </a:p>
@@ -4307,7 +4313,7 @@
           <a:p>
             <a:fld id="{F4D54B8B-CF9D-4A48-A858-B7AFB3BACA32}" type="datetimeFigureOut">
               <a:rPr lang="en-GB" smtClean="0"/>
-              <a:t>23/03/2021</a:t>
+              <a:t>25/03/2021</a:t>
             </a:fld>
             <a:endParaRPr lang="en-GB"/>
           </a:p>
@@ -4570,7 +4576,7 @@
           <a:p>
             <a:fld id="{F4D54B8B-CF9D-4A48-A858-B7AFB3BACA32}" type="datetimeFigureOut">
               <a:rPr lang="en-GB" smtClean="0"/>
-              <a:t>23/03/2021</a:t>
+              <a:t>25/03/2021</a:t>
             </a:fld>
             <a:endParaRPr lang="en-GB"/>
           </a:p>
@@ -5313,7 +5319,7 @@
           <a:p>
             <a:fld id="{F4D54B8B-CF9D-4A48-A858-B7AFB3BACA32}" type="datetimeFigureOut">
               <a:rPr lang="en-GB" smtClean="0"/>
-              <a:t>23/03/2021</a:t>
+              <a:t>25/03/2021</a:t>
             </a:fld>
             <a:endParaRPr lang="en-GB"/>
           </a:p>
@@ -6850,6 +6856,204 @@
           <p:cNvPr id="2" name="Title 1">
             <a:extLst>
               <a:ext uri="{FF2B5EF4-FFF2-40B4-BE49-F238E27FC236}">
+                <a16:creationId xmlns:a16="http://schemas.microsoft.com/office/drawing/2014/main" id="{51B9F4C6-4789-44AD-B522-389A2D9F1981}"/>
+              </a:ext>
+            </a:extLst>
+          </p:cNvPr>
+          <p:cNvSpPr>
+            <a:spLocks noGrp="1"/>
+          </p:cNvSpPr>
+          <p:nvPr>
+            <p:ph type="title"/>
+          </p:nvPr>
+        </p:nvSpPr>
+        <p:spPr/>
+        <p:txBody>
+          <a:bodyPr/>
+          <a:lstStyle/>
+          <a:p>
+            <a:r>
+              <a:rPr lang="en-GB" dirty="0"/>
+              <a:t>Conclusion</a:t>
+            </a:r>
+          </a:p>
+        </p:txBody>
+      </p:sp>
+      <p:sp>
+        <p:nvSpPr>
+          <p:cNvPr id="3" name="TextBox 2">
+            <a:extLst>
+              <a:ext uri="{FF2B5EF4-FFF2-40B4-BE49-F238E27FC236}">
+                <a16:creationId xmlns:a16="http://schemas.microsoft.com/office/drawing/2014/main" id="{E665CA03-05EC-427E-8B61-72DE1E1479C7}"/>
+              </a:ext>
+            </a:extLst>
+          </p:cNvPr>
+          <p:cNvSpPr txBox="1"/>
+          <p:nvPr/>
+        </p:nvSpPr>
+        <p:spPr>
+          <a:xfrm>
+            <a:off x="677334" y="1457325"/>
+            <a:ext cx="10047816" cy="4524315"/>
+          </a:xfrm>
+          <a:prstGeom prst="rect">
+            <a:avLst/>
+          </a:prstGeom>
+          <a:noFill/>
+        </p:spPr>
+        <p:txBody>
+          <a:bodyPr wrap="square" rtlCol="0">
+            <a:spAutoFit/>
+          </a:bodyPr>
+          <a:lstStyle/>
+          <a:p>
+            <a:r>
+              <a:rPr lang="en-GB" dirty="0"/>
+              <a:t>Benefits:</a:t>
+            </a:r>
+          </a:p>
+          <a:p>
+            <a:pPr marL="342900" indent="-342900">
+              <a:buAutoNum type="arabicParenR"/>
+            </a:pPr>
+            <a:r>
+              <a:rPr lang="en-GB" dirty="0"/>
+              <a:t>A tailored application to create, view and manage projects/business cases </a:t>
+            </a:r>
+          </a:p>
+          <a:p>
+            <a:pPr marL="342900" indent="-342900">
+              <a:buAutoNum type="arabicParenR"/>
+            </a:pPr>
+            <a:r>
+              <a:rPr lang="en-GB" dirty="0"/>
+              <a:t>Streamlined process allowing for easy transition between all stages of the project</a:t>
+            </a:r>
+          </a:p>
+          <a:p>
+            <a:pPr marL="342900" indent="-342900">
+              <a:buAutoNum type="arabicParenR"/>
+            </a:pPr>
+            <a:r>
+              <a:rPr lang="en-GB" dirty="0"/>
+              <a:t>Centralised point where you can view the data in a user friendly way </a:t>
+            </a:r>
+          </a:p>
+          <a:p>
+            <a:pPr marL="342900" indent="-342900">
+              <a:buAutoNum type="arabicParenR"/>
+            </a:pPr>
+            <a:r>
+              <a:rPr lang="en-GB" dirty="0"/>
+              <a:t>Digitalises paperwork so easier to manage and share </a:t>
+            </a:r>
+          </a:p>
+          <a:p>
+            <a:pPr marL="342900" indent="-342900">
+              <a:buAutoNum type="arabicParenR"/>
+            </a:pPr>
+            <a:r>
+              <a:rPr lang="en-GB" dirty="0"/>
+              <a:t>Questionnaire – list of managers updates dynamically </a:t>
+            </a:r>
+          </a:p>
+          <a:p>
+            <a:pPr marL="342900" indent="-342900">
+              <a:buAutoNum type="arabicParenR"/>
+            </a:pPr>
+            <a:endParaRPr lang="en-GB" dirty="0"/>
+          </a:p>
+          <a:p>
+            <a:endParaRPr lang="en-GB" dirty="0"/>
+          </a:p>
+          <a:p>
+            <a:endParaRPr lang="en-GB" dirty="0"/>
+          </a:p>
+          <a:p>
+            <a:r>
+              <a:rPr lang="en-GB" dirty="0"/>
+              <a:t>Limitations: </a:t>
+            </a:r>
+          </a:p>
+          <a:p>
+            <a:pPr marL="342900" indent="-342900">
+              <a:buAutoNum type="arabicParenR"/>
+            </a:pPr>
+            <a:r>
+              <a:rPr lang="en-GB" dirty="0"/>
+              <a:t>MVP done but extra features we didn’t have time for </a:t>
+            </a:r>
+          </a:p>
+          <a:p>
+            <a:pPr marL="342900" indent="-342900">
+              <a:buAutoNum type="arabicParenR"/>
+            </a:pPr>
+            <a:r>
+              <a:rPr lang="en-GB" dirty="0"/>
+              <a:t>Questionnaire – doesn’t notify if someone is on holiday or not</a:t>
+            </a:r>
+          </a:p>
+          <a:p>
+            <a:pPr marL="342900" indent="-342900">
+              <a:buAutoNum type="arabicParenR"/>
+            </a:pPr>
+            <a:r>
+              <a:rPr lang="en-GB" dirty="0"/>
+              <a:t>Editing business cases – not prefilled data on form </a:t>
+            </a:r>
+          </a:p>
+          <a:p>
+            <a:endParaRPr lang="en-GB" dirty="0"/>
+          </a:p>
+          <a:p>
+            <a:pPr marL="342900" indent="-342900">
+              <a:buAutoNum type="arabicParenR"/>
+            </a:pPr>
+            <a:endParaRPr lang="en-GB" dirty="0"/>
+          </a:p>
+          <a:p>
+            <a:pPr marL="342900" indent="-342900">
+              <a:buAutoNum type="arabicParenR"/>
+            </a:pPr>
+            <a:endParaRPr lang="en-GB" dirty="0"/>
+          </a:p>
+        </p:txBody>
+      </p:sp>
+    </p:spTree>
+    <p:extLst>
+      <p:ext uri="{BB962C8B-B14F-4D97-AF65-F5344CB8AC3E}">
+        <p14:creationId xmlns:p14="http://schemas.microsoft.com/office/powerpoint/2010/main" val="3374630850"/>
+      </p:ext>
+    </p:extLst>
+  </p:cSld>
+  <p:clrMapOvr>
+    <a:masterClrMapping/>
+  </p:clrMapOvr>
+</p:sld>
+</file>
+
+<file path=ppt/slides/slide15.xml><?xml version="1.0" encoding="utf-8"?>
+<p:sld xmlns:a="http://schemas.openxmlformats.org/drawingml/2006/main" xmlns:r="http://schemas.openxmlformats.org/officeDocument/2006/relationships" xmlns:p="http://schemas.openxmlformats.org/presentationml/2006/main">
+  <p:cSld>
+    <p:spTree>
+      <p:nvGrpSpPr>
+        <p:cNvPr id="1" name=""/>
+        <p:cNvGrpSpPr/>
+        <p:nvPr/>
+      </p:nvGrpSpPr>
+      <p:grpSpPr>
+        <a:xfrm>
+          <a:off x="0" y="0"/>
+          <a:ext cx="0" cy="0"/>
+          <a:chOff x="0" y="0"/>
+          <a:chExt cx="0" cy="0"/>
+        </a:xfrm>
+      </p:grpSpPr>
+      <p:sp>
+        <p:nvSpPr>
+          <p:cNvPr id="2" name="Title 1">
+            <a:extLst>
+              <a:ext uri="{FF2B5EF4-FFF2-40B4-BE49-F238E27FC236}">
                 <a16:creationId xmlns:a16="http://schemas.microsoft.com/office/drawing/2014/main" id="{D3370E34-E867-4410-9500-4001ADBC24AB}"/>
               </a:ext>
             </a:extLst>

</xml_diff>